<commit_message>
백업 완료: 2023-11-25 04:32:07
Affected files:
노코드 엔지니어링/피그마로 UI 디자인하기.pptx
</commit_message>
<xml_diff>
--- a/노코드 엔지니어링/피그마로 UI 디자인하기.pptx
+++ b/노코드 엔지니어링/피그마로 UI 디자인하기.pptx
@@ -3053,7 +3053,7 @@
         <p:nvSpPr>
           <p:cNvPr id="8" name="Rectangle 7"/>
           <p:cNvSpPr/>
-          <p:nvPr/>
+          <p:nvPr userDrawn="1"/>
         </p:nvSpPr>
         <p:spPr>
           <a:xfrm>
@@ -3218,6 +3218,9 @@
               <a:rPr altLang="ko-KR" dirty="0" lang="en-US"/>
               <a:t>Fifth level</a:t>
             </a:r>
+          </a:p>
+          <a:p>
+            <a:pPr lvl="0"/>
             <a:endParaRPr dirty="0" lang="en-US"/>
           </a:p>
         </p:txBody>
@@ -3465,7 +3468,7 @@
           <a:cs typeface="+mn-cs"/>
         </a:defRPr>
       </a:lvl2pPr>
-      <a:lvl3pPr algn="l" defTabSz="914400" eaLnBrk="1" hangingPunct="1" indent="-180000" latinLnBrk="1" marL="720000" rtl="0">
+      <a:lvl3pPr algn="l" defTabSz="914400" eaLnBrk="1" hangingPunct="1" indent="-342900" latinLnBrk="1" marL="882900" rtl="0">
         <a:lnSpc>
           <a:spcPct val="110000"/>
         </a:lnSpc>
@@ -3476,8 +3479,8 @@
           <a:schemeClr val="accent1"/>
         </a:buClr>
         <a:buSzPct val="100000"/>
-        <a:buFont charset="0" panose="020B0604020202020204" pitchFamily="34" typeface="Arial"/>
-        <a:buChar char="•"/>
+        <a:buFont typeface="+mj-lt"/>
+        <a:buAutoNum type="arabicPeriod"/>
         <a:defRPr kern="1200" sz="1400">
           <a:solidFill>
             <a:schemeClr val="tx1"/>
@@ -3488,7 +3491,7 @@
           <a:cs typeface="+mn-cs"/>
         </a:defRPr>
       </a:lvl3pPr>
-      <a:lvl4pPr algn="l" defTabSz="914400" eaLnBrk="1" hangingPunct="1" indent="-180000" latinLnBrk="1" marL="990000" rtl="0">
+      <a:lvl4pPr algn="l" defTabSz="914400" eaLnBrk="1" hangingPunct="1" indent="-342900" latinLnBrk="1" marL="1152900" rtl="0">
         <a:lnSpc>
           <a:spcPct val="110000"/>
         </a:lnSpc>
@@ -3499,8 +3502,8 @@
           <a:schemeClr val="accent1"/>
         </a:buClr>
         <a:buSzPct val="100000"/>
-        <a:buFont charset="0" panose="020B0604020202020204" pitchFamily="34" typeface="Arial"/>
-        <a:buChar char="•"/>
+        <a:buFont typeface="+mj-lt"/>
+        <a:buAutoNum type="arabicPeriod"/>
         <a:defRPr baseline="0" cap="none" kern="1200" sz="1400">
           <a:solidFill>
             <a:schemeClr val="tx1"/>
@@ -3511,7 +3514,7 @@
           <a:cs typeface="+mn-cs"/>
         </a:defRPr>
       </a:lvl4pPr>
-      <a:lvl5pPr algn="l" defTabSz="914400" eaLnBrk="1" hangingPunct="1" indent="-180000" latinLnBrk="1" marL="1260000" rtl="0">
+      <a:lvl5pPr algn="l" defTabSz="914400" eaLnBrk="1" hangingPunct="1" indent="-342900" latinLnBrk="1" marL="1422900" rtl="0">
         <a:lnSpc>
           <a:spcPct val="110000"/>
         </a:lnSpc>
@@ -3522,8 +3525,8 @@
           <a:schemeClr val="accent1"/>
         </a:buClr>
         <a:buSzPct val="100000"/>
-        <a:buFont charset="0" panose="020B0604020202020204" pitchFamily="34" typeface="Arial"/>
-        <a:buChar char="•"/>
+        <a:buFont typeface="+mj-lt"/>
+        <a:buAutoNum type="arabicPeriod"/>
         <a:defRPr kern="1200" sz="1400">
           <a:solidFill>
             <a:schemeClr val="tx1"/>

</xml_diff>

<commit_message>
백업 완료: 2023-11-25 04:33:55
Affected files:
노코드 엔지니어링/피그마로 UI 디자인하기.pptx
</commit_message>
<xml_diff>
--- a/노코드 엔지니어링/피그마로 UI 디자인하기.pptx
+++ b/노코드 엔지니어링/피그마로 UI 디자인하기.pptx
@@ -201,6 +201,9 @@
             <a:off x="2417780" y="3531204"/>
             <a:ext cx="8637072" cy="977621"/>
           </a:xfrm>
+          <a:prstGeom prst="rect">
+            <a:avLst/>
+          </a:prstGeom>
         </p:spPr>
         <p:txBody>
           <a:bodyPr tIns="91440" bIns="91440">
@@ -426,7 +429,15 @@
             <p:ph type="body" orient="vert" idx="1"/>
           </p:nvPr>
         </p:nvSpPr>
-        <p:spPr/>
+        <p:spPr>
+          <a:xfrm>
+            <a:off x="1451579" y="1520384"/>
+            <a:ext cx="9603275" cy="3945962"/>
+          </a:xfrm>
+          <a:prstGeom prst="rect">
+            <a:avLst/>
+          </a:prstGeom>
+        </p:spPr>
         <p:txBody>
           <a:bodyPr vert="eaVert"/>
           <a:lstStyle/>
@@ -641,6 +652,9 @@
             <a:off x="1444672" y="798973"/>
             <a:ext cx="7828830" cy="4659889"/>
           </a:xfrm>
+          <a:prstGeom prst="rect">
+            <a:avLst/>
+          </a:prstGeom>
         </p:spPr>
         <p:txBody>
           <a:bodyPr vert="eaVert"/>
@@ -793,7 +807,7 @@
 </file>
 
 <file path=ppt/slideLayouts/slideLayout2.xml><?xml version="1.0" encoding="utf-8"?>
-<p:sldLayout xmlns:a="http://schemas.openxmlformats.org/drawingml/2006/main" xmlns:r="http://schemas.openxmlformats.org/officeDocument/2006/relationships" xmlns:p="http://schemas.openxmlformats.org/presentationml/2006/main" type="obj" preserve="1">
+<p:sldLayout xmlns:a="http://schemas.openxmlformats.org/drawingml/2006/main" xmlns:r="http://schemas.openxmlformats.org/officeDocument/2006/relationships" xmlns:p="http://schemas.openxmlformats.org/presentationml/2006/main" preserve="1" userDrawn="1">
   <p:cSld name="Title and Content">
     <p:spTree>
       <p:nvGrpSpPr>
@@ -842,7 +856,15 @@
             <p:ph idx="1"/>
           </p:nvPr>
         </p:nvSpPr>
-        <p:spPr/>
+        <p:spPr>
+          <a:xfrm>
+            <a:off x="1451579" y="1520384"/>
+            <a:ext cx="9603275" cy="3945962"/>
+          </a:xfrm>
+          <a:prstGeom prst="rect">
+            <a:avLst/>
+          </a:prstGeom>
+        </p:spPr>
         <p:txBody>
           <a:bodyPr anchor="t"/>
           <a:lstStyle/>
@@ -1028,6 +1050,9 @@
             <a:off x="1454239" y="3806195"/>
             <a:ext cx="8630446" cy="1012929"/>
           </a:xfrm>
+          <a:prstGeom prst="rect">
+            <a:avLst/>
+          </a:prstGeom>
         </p:spPr>
         <p:txBody>
           <a:bodyPr tIns="91440">
@@ -1270,6 +1295,9 @@
             <a:off x="1447331" y="1556450"/>
             <a:ext cx="4645152" cy="3903023"/>
           </a:xfrm>
+          <a:prstGeom prst="rect">
+            <a:avLst/>
+          </a:prstGeom>
         </p:spPr>
         <p:txBody>
           <a:bodyPr/>
@@ -1327,6 +1355,9 @@
             <a:off x="6413771" y="1563847"/>
             <a:ext cx="4645152" cy="3895016"/>
           </a:xfrm>
+          <a:prstGeom prst="rect">
+            <a:avLst/>
+          </a:prstGeom>
         </p:spPr>
         <p:txBody>
           <a:bodyPr/>
@@ -1507,6 +1538,9 @@
             <a:off x="1447191" y="2019549"/>
             <a:ext cx="4645152" cy="801943"/>
           </a:xfrm>
+          <a:prstGeom prst="rect">
+            <a:avLst/>
+          </a:prstGeom>
         </p:spPr>
         <p:txBody>
           <a:bodyPr anchor="b">
@@ -1581,6 +1615,9 @@
             <a:off x="1447191" y="2824269"/>
             <a:ext cx="4645152" cy="2644457"/>
           </a:xfrm>
+          <a:prstGeom prst="rect">
+            <a:avLst/>
+          </a:prstGeom>
         </p:spPr>
         <p:txBody>
           <a:bodyPr/>
@@ -1638,6 +1675,9 @@
             <a:off x="6412362" y="2023003"/>
             <a:ext cx="4645152" cy="802237"/>
           </a:xfrm>
+          <a:prstGeom prst="rect">
+            <a:avLst/>
+          </a:prstGeom>
         </p:spPr>
         <p:txBody>
           <a:bodyPr anchor="b">
@@ -1712,6 +1752,9 @@
             <a:off x="6412362" y="2821491"/>
             <a:ext cx="4645152" cy="2637371"/>
           </a:xfrm>
+          <a:prstGeom prst="rect">
+            <a:avLst/>
+          </a:prstGeom>
         </p:spPr>
         <p:txBody>
           <a:bodyPr/>
@@ -2173,6 +2216,9 @@
             <a:off x="5043714" y="798974"/>
             <a:ext cx="6012470" cy="4658826"/>
           </a:xfrm>
+          <a:prstGeom prst="rect">
+            <a:avLst/>
+          </a:prstGeom>
         </p:spPr>
         <p:txBody>
           <a:bodyPr anchor="ctr"/>
@@ -2230,6 +2276,9 @@
             <a:off x="1444671" y="2006887"/>
             <a:ext cx="3275013" cy="3446786"/>
           </a:xfrm>
+          <a:prstGeom prst="rect">
+            <a:avLst/>
+          </a:prstGeom>
         </p:spPr>
         <p:txBody>
           <a:bodyPr/>
@@ -2777,6 +2826,9 @@
             <a:off x="8124389" y="1122542"/>
             <a:ext cx="2791171" cy="3866327"/>
           </a:xfrm>
+          <a:prstGeom prst="rect">
+            <a:avLst/>
+          </a:prstGeom>
           <a:solidFill>
             <a:schemeClr val="bg1">
               <a:lumMod val="85000"/>
@@ -2852,6 +2904,9 @@
             <a:off x="1450329" y="3145992"/>
             <a:ext cx="5524404" cy="2003742"/>
           </a:xfrm>
+          <a:prstGeom prst="rect">
+            <a:avLst/>
+          </a:prstGeom>
         </p:spPr>
         <p:txBody>
           <a:bodyPr>
@@ -3049,55 +3104,6 @@
           <a:chExt cx="0" cy="0"/>
         </a:xfrm>
       </p:grpSpPr>
-      <p:sp>
-        <p:nvSpPr>
-          <p:cNvPr id="8" name="Rectangle 7"/>
-          <p:cNvSpPr/>
-          <p:nvPr userDrawn="1"/>
-        </p:nvSpPr>
-        <p:spPr>
-          <a:xfrm>
-            <a:off x="0" y="2019476"/>
-            <a:ext cx="12192000" cy="4105941"/>
-          </a:xfrm>
-          <a:prstGeom prst="rect">
-            <a:avLst/>
-          </a:prstGeom>
-          <a:gradFill flip="none" rotWithShape="1">
-            <a:gsLst>
-              <a:gs pos="0">
-                <a:schemeClr val="bg2">
-                  <a:alpha val="0"/>
-                </a:schemeClr>
-              </a:gs>
-              <a:gs pos="100000">
-                <a:schemeClr val="bg2"/>
-              </a:gs>
-            </a:gsLst>
-            <a:lin ang="5400000" scaled="0"/>
-            <a:tileRect/>
-          </a:gradFill>
-          <a:ln>
-            <a:noFill/>
-          </a:ln>
-        </p:spPr>
-        <p:style>
-          <a:lnRef idx="2">
-            <a:schemeClr val="accent1">
-              <a:shade val="50000"/>
-            </a:schemeClr>
-          </a:lnRef>
-          <a:fillRef idx="1">
-            <a:schemeClr val="accent1"/>
-          </a:fillRef>
-          <a:effectRef idx="0">
-            <a:schemeClr val="accent1"/>
-          </a:effectRef>
-          <a:fontRef idx="minor">
-            <a:schemeClr val="lt1"/>
-          </a:fontRef>
-        </p:style>
-      </p:sp>
       <p:pic>
         <p:nvPicPr>
           <p:cNvPr id="7" name="Picture 6"/>
@@ -3468,7 +3474,7 @@
           <a:cs typeface="+mn-cs"/>
         </a:defRPr>
       </a:lvl2pPr>
-      <a:lvl3pPr algn="l" defTabSz="914400" eaLnBrk="1" hangingPunct="1" indent="-342900" latinLnBrk="1" marL="882900" rtl="0">
+      <a:lvl3pPr algn="l" defTabSz="914400" eaLnBrk="1" hangingPunct="1" indent="-180000" latinLnBrk="1" marL="720000" rtl="0">
         <a:lnSpc>
           <a:spcPct val="110000"/>
         </a:lnSpc>
@@ -3479,8 +3485,8 @@
           <a:schemeClr val="accent1"/>
         </a:buClr>
         <a:buSzPct val="100000"/>
-        <a:buFont typeface="+mj-lt"/>
-        <a:buAutoNum type="arabicPeriod"/>
+        <a:buFont charset="0" panose="020B0604020202020204" pitchFamily="34" typeface="Arial"/>
+        <a:buChar char="•"/>
         <a:defRPr kern="1200" sz="1400">
           <a:solidFill>
             <a:schemeClr val="tx1"/>
@@ -3491,7 +3497,7 @@
           <a:cs typeface="+mn-cs"/>
         </a:defRPr>
       </a:lvl3pPr>
-      <a:lvl4pPr algn="l" defTabSz="914400" eaLnBrk="1" hangingPunct="1" indent="-342900" latinLnBrk="1" marL="1152900" rtl="0">
+      <a:lvl4pPr algn="l" defTabSz="914400" eaLnBrk="1" hangingPunct="1" indent="-180000" latinLnBrk="1" marL="990000" rtl="0">
         <a:lnSpc>
           <a:spcPct val="110000"/>
         </a:lnSpc>
@@ -3502,8 +3508,8 @@
           <a:schemeClr val="accent1"/>
         </a:buClr>
         <a:buSzPct val="100000"/>
-        <a:buFont typeface="+mj-lt"/>
-        <a:buAutoNum type="arabicPeriod"/>
+        <a:buFont charset="0" panose="020B0604020202020204" pitchFamily="34" typeface="Arial"/>
+        <a:buChar char="•"/>
         <a:defRPr baseline="0" cap="none" kern="1200" sz="1400">
           <a:solidFill>
             <a:schemeClr val="tx1"/>
@@ -3514,7 +3520,7 @@
           <a:cs typeface="+mn-cs"/>
         </a:defRPr>
       </a:lvl4pPr>
-      <a:lvl5pPr algn="l" defTabSz="914400" eaLnBrk="1" hangingPunct="1" indent="-342900" latinLnBrk="1" marL="1422900" rtl="0">
+      <a:lvl5pPr algn="l" defTabSz="914400" eaLnBrk="1" hangingPunct="1" indent="-180000" latinLnBrk="1" marL="1260000" rtl="0">
         <a:lnSpc>
           <a:spcPct val="110000"/>
         </a:lnSpc>
@@ -3525,8 +3531,8 @@
           <a:schemeClr val="accent1"/>
         </a:buClr>
         <a:buSzPct val="100000"/>
-        <a:buFont typeface="+mj-lt"/>
-        <a:buAutoNum type="arabicPeriod"/>
+        <a:buFont charset="0" panose="020B0604020202020204" pitchFamily="34" typeface="Arial"/>
+        <a:buChar char="•"/>
         <a:defRPr kern="1200" sz="1400">
           <a:solidFill>
             <a:schemeClr val="tx1"/>

</xml_diff>